<commit_message>
Finishing Touches on Presentations
I finished up Day 2, changed the spelling of MATLAB to be all caps
throughout, and made sure that the "This is what mine looks like" was
included for each example in both days.
</commit_message>
<xml_diff>
--- a/Day 1 of Crash Course/University of Illinois REU Introduction to Matlab Day 1.pptx
+++ b/Day 1 of Crash Course/University of Illinois REU Introduction to Matlab Day 1.pptx
@@ -14,8 +14,8 @@
     <p:sldId id="262" r:id="rId8"/>
     <p:sldId id="264" r:id="rId9"/>
     <p:sldId id="270" r:id="rId10"/>
-    <p:sldId id="267" r:id="rId11"/>
-    <p:sldId id="271" r:id="rId12"/>
+    <p:sldId id="273" r:id="rId11"/>
+    <p:sldId id="267" r:id="rId12"/>
     <p:sldId id="272" r:id="rId13"/>
   </p:sldIdLst>
   <p:sldSz cx="12192000" cy="6858000"/>
@@ -252,7 +252,7 @@
           <a:p>
             <a:fld id="{4F813D5D-9D8E-4484-BE86-4458FD589FAD}" type="datetimeFigureOut">
               <a:rPr lang="en-US" smtClean="0"/>
-              <a:t>6/16/2017</a:t>
+              <a:t>7/7/2017</a:t>
             </a:fld>
             <a:endParaRPr lang="en-US"/>
           </a:p>
@@ -420,7 +420,7 @@
           <a:p>
             <a:fld id="{4F813D5D-9D8E-4484-BE86-4458FD589FAD}" type="datetimeFigureOut">
               <a:rPr lang="en-US" smtClean="0"/>
-              <a:t>6/16/2017</a:t>
+              <a:t>7/7/2017</a:t>
             </a:fld>
             <a:endParaRPr lang="en-US"/>
           </a:p>
@@ -598,7 +598,7 @@
           <a:p>
             <a:fld id="{4F813D5D-9D8E-4484-BE86-4458FD589FAD}" type="datetimeFigureOut">
               <a:rPr lang="en-US" smtClean="0"/>
-              <a:t>6/16/2017</a:t>
+              <a:t>7/7/2017</a:t>
             </a:fld>
             <a:endParaRPr lang="en-US"/>
           </a:p>
@@ -766,7 +766,7 @@
           <a:p>
             <a:fld id="{4F813D5D-9D8E-4484-BE86-4458FD589FAD}" type="datetimeFigureOut">
               <a:rPr lang="en-US" smtClean="0"/>
-              <a:t>6/16/2017</a:t>
+              <a:t>7/7/2017</a:t>
             </a:fld>
             <a:endParaRPr lang="en-US"/>
           </a:p>
@@ -1011,7 +1011,7 @@
           <a:p>
             <a:fld id="{4F813D5D-9D8E-4484-BE86-4458FD589FAD}" type="datetimeFigureOut">
               <a:rPr lang="en-US" smtClean="0"/>
-              <a:t>6/16/2017</a:t>
+              <a:t>7/7/2017</a:t>
             </a:fld>
             <a:endParaRPr lang="en-US"/>
           </a:p>
@@ -1240,7 +1240,7 @@
           <a:p>
             <a:fld id="{4F813D5D-9D8E-4484-BE86-4458FD589FAD}" type="datetimeFigureOut">
               <a:rPr lang="en-US" smtClean="0"/>
-              <a:t>6/16/2017</a:t>
+              <a:t>7/7/2017</a:t>
             </a:fld>
             <a:endParaRPr lang="en-US"/>
           </a:p>
@@ -1604,7 +1604,7 @@
           <a:p>
             <a:fld id="{4F813D5D-9D8E-4484-BE86-4458FD589FAD}" type="datetimeFigureOut">
               <a:rPr lang="en-US" smtClean="0"/>
-              <a:t>6/16/2017</a:t>
+              <a:t>7/7/2017</a:t>
             </a:fld>
             <a:endParaRPr lang="en-US"/>
           </a:p>
@@ -1721,7 +1721,7 @@
           <a:p>
             <a:fld id="{4F813D5D-9D8E-4484-BE86-4458FD589FAD}" type="datetimeFigureOut">
               <a:rPr lang="en-US" smtClean="0"/>
-              <a:t>6/16/2017</a:t>
+              <a:t>7/7/2017</a:t>
             </a:fld>
             <a:endParaRPr lang="en-US"/>
           </a:p>
@@ -1816,7 +1816,7 @@
           <a:p>
             <a:fld id="{4F813D5D-9D8E-4484-BE86-4458FD589FAD}" type="datetimeFigureOut">
               <a:rPr lang="en-US" smtClean="0"/>
-              <a:t>6/16/2017</a:t>
+              <a:t>7/7/2017</a:t>
             </a:fld>
             <a:endParaRPr lang="en-US"/>
           </a:p>
@@ -2091,7 +2091,7 @@
           <a:p>
             <a:fld id="{4F813D5D-9D8E-4484-BE86-4458FD589FAD}" type="datetimeFigureOut">
               <a:rPr lang="en-US" smtClean="0"/>
-              <a:t>6/16/2017</a:t>
+              <a:t>7/7/2017</a:t>
             </a:fld>
             <a:endParaRPr lang="en-US"/>
           </a:p>
@@ -2346,7 +2346,7 @@
           <a:p>
             <a:fld id="{4F813D5D-9D8E-4484-BE86-4458FD589FAD}" type="datetimeFigureOut">
               <a:rPr lang="en-US" smtClean="0"/>
-              <a:t>6/16/2017</a:t>
+              <a:t>7/7/2017</a:t>
             </a:fld>
             <a:endParaRPr lang="en-US"/>
           </a:p>
@@ -2593,7 +2593,7 @@
           <a:p>
             <a:fld id="{4F813D5D-9D8E-4484-BE86-4458FD589FAD}" type="datetimeFigureOut">
               <a:rPr lang="en-US" smtClean="0"/>
-              <a:t>6/16/2017</a:t>
+              <a:t>7/7/2017</a:t>
             </a:fld>
             <a:endParaRPr lang="en-US"/>
           </a:p>
@@ -3020,13 +3020,8 @@
           <a:p>
             <a:r>
               <a:rPr lang="en-US" dirty="0"/>
-              <a:t>University of Illinois REU Introduction to </a:t>
-            </a:r>
-            <a:r>
-              <a:rPr lang="en-US" dirty="0" err="1"/>
-              <a:t>Matlab</a:t>
-            </a:r>
-            <a:endParaRPr lang="en-US" dirty="0"/>
+              <a:t>University of Illinois REU Introduction to MATLAB</a:t>
+            </a:r>
           </a:p>
         </p:txBody>
       </p:sp>
@@ -3122,23 +3117,7 @@
           <a:p>
             <a:r>
               <a:rPr lang="en-US" dirty="0"/>
-              <a:t>This is designed to provide guided self learning of using </a:t>
-            </a:r>
-            <a:r>
-              <a:rPr lang="en-US" dirty="0" err="1"/>
-              <a:t>matlab</a:t>
-            </a:r>
-            <a:r>
-              <a:rPr lang="en-US" dirty="0"/>
-              <a:t> for analysis and plotting of data.  The self guided part is to enable you to go back later in the summer and relearn/refresh your </a:t>
-            </a:r>
-            <a:r>
-              <a:rPr lang="en-US" dirty="0" err="1"/>
-              <a:t>matlab</a:t>
-            </a:r>
-            <a:r>
-              <a:rPr lang="en-US" dirty="0"/>
-              <a:t> knowledge on your own.  </a:t>
+              <a:t>This is designed to provide guided self learning of using MATLAB for analysis and plotting of data.  The self guided part is to enable you to go back later in the summer and relearn/refresh your MATLAB knowledge on your own.  </a:t>
             </a:r>
           </a:p>
           <a:p>
@@ -3233,14 +3212,19 @@
             <p:ph type="title"/>
           </p:nvPr>
         </p:nvSpPr>
-        <p:spPr/>
+        <p:spPr>
+          <a:xfrm>
+            <a:off x="126460" y="-113454"/>
+            <a:ext cx="10515600" cy="1325563"/>
+          </a:xfrm>
+        </p:spPr>
         <p:txBody>
           <a:bodyPr/>
           <a:lstStyle/>
           <a:p>
             <a:r>
               <a:rPr lang="en-US" dirty="0"/>
-              <a:t>2014 Boston Marathon Data</a:t>
+              <a:t>Importing Data</a:t>
             </a:r>
           </a:p>
         </p:txBody>
@@ -3257,13 +3241,13 @@
         </p:nvSpPr>
         <p:spPr>
           <a:xfrm>
-            <a:off x="569670" y="1525317"/>
-            <a:ext cx="11191070" cy="1431891"/>
+            <a:off x="361545" y="1089557"/>
+            <a:ext cx="8597630" cy="4233153"/>
           </a:xfrm>
         </p:spPr>
         <p:txBody>
           <a:bodyPr>
-            <a:normAutofit fontScale="92500"/>
+            <a:normAutofit/>
           </a:bodyPr>
           <a:lstStyle/>
           <a:p>
@@ -3271,46 +3255,120 @@
               <a:buNone/>
             </a:pPr>
             <a:r>
-              <a:rPr lang="en-US" dirty="0"/>
-              <a:t>As the last step, we will explore different plotting functions using some test data.  The test data set is the 2014 Boston Marathon Results.  The original data can be found on </a:t>
-            </a:r>
-            <a:r>
-              <a:rPr lang="en-US" dirty="0" err="1"/>
-              <a:t>Git</a:t>
-            </a:r>
-            <a:r>
-              <a:rPr lang="en-US" dirty="0"/>
-              <a:t> Hub here, but a cleaner version is in the </a:t>
-            </a:r>
-            <a:r>
-              <a:rPr lang="en-US" dirty="0" err="1"/>
-              <a:t>Matlab</a:t>
-            </a:r>
-            <a:r>
-              <a:rPr lang="en-US" dirty="0"/>
-              <a:t> Intro Folder.</a:t>
+              <a:rPr lang="en-US" b="1" u="sng" dirty="0"/>
+              <a:t>Using Code </a:t>
+            </a:r>
+            <a:r>
+              <a:rPr lang="en-US" dirty="0"/>
+              <a:t>– </a:t>
+            </a:r>
+            <a:r>
+              <a:rPr lang="en-US" sz="2400" dirty="0"/>
+              <a:t>MATLAB has support for importing a large variety of different file formats (</a:t>
+            </a:r>
+            <a:r>
+              <a:rPr lang="en-US" sz="2400" dirty="0">
+                <a:hlinkClick r:id="rId2"/>
+              </a:rPr>
+              <a:t>see her</a:t>
+            </a:r>
+            <a:r>
+              <a:rPr lang="en-US" sz="2400" dirty="0"/>
+              <a:t>e) the easiest of which are csv files (</a:t>
+            </a:r>
+            <a:r>
+              <a:rPr lang="en-US" sz="2400" dirty="0" err="1"/>
+              <a:t>csvread</a:t>
+            </a:r>
+            <a:r>
+              <a:rPr lang="en-US" sz="2400" dirty="0"/>
+              <a:t> and </a:t>
+            </a:r>
+            <a:r>
+              <a:rPr lang="en-US" sz="2400" dirty="0" err="1"/>
+              <a:t>csvwrite</a:t>
+            </a:r>
+            <a:r>
+              <a:rPr lang="en-US" sz="2400" dirty="0"/>
+              <a:t> commands) .  For this course we will stick to using the drag and drop functionality of the GUI for importing data.</a:t>
+            </a:r>
+          </a:p>
+          <a:p>
+            <a:pPr marL="0" indent="0">
+              <a:buNone/>
+            </a:pPr>
+            <a:endParaRPr lang="en-US" sz="2400" dirty="0"/>
+          </a:p>
+          <a:p>
+            <a:pPr marL="0" indent="0">
+              <a:buNone/>
+            </a:pPr>
+            <a:r>
+              <a:rPr lang="en-US" b="1" u="sng" dirty="0"/>
+              <a:t>In the GUI –</a:t>
+            </a:r>
+            <a:r>
+              <a:rPr lang="en-US" dirty="0"/>
+              <a:t> </a:t>
+            </a:r>
+            <a:r>
+              <a:rPr lang="en-US" sz="2400" dirty="0"/>
+              <a:t>Dragging and dropping the file into the workspace opens the MATLAB import wizard which auto configures correctly for most data files.  </a:t>
+            </a:r>
+          </a:p>
+          <a:p>
+            <a:pPr marL="0" indent="0">
+              <a:buNone/>
+            </a:pPr>
+            <a:endParaRPr lang="en-US" sz="2400" dirty="0"/>
+          </a:p>
+        </p:txBody>
+      </p:sp>
+      <p:sp>
+        <p:nvSpPr>
+          <p:cNvPr id="4" name="Rectangle 3"/>
+          <p:cNvSpPr/>
+          <p:nvPr/>
+        </p:nvSpPr>
+        <p:spPr>
+          <a:xfrm>
+            <a:off x="501610" y="4418351"/>
+            <a:ext cx="5391026" cy="1477328"/>
+          </a:xfrm>
+          <a:prstGeom prst="rect">
+            <a:avLst/>
+          </a:prstGeom>
+        </p:spPr>
+        <p:txBody>
+          <a:bodyPr wrap="square">
+            <a:spAutoFit/>
+          </a:bodyPr>
+          <a:lstStyle/>
+          <a:p>
+            <a:r>
+              <a:rPr lang="en-US" b="1" i="1" dirty="0"/>
+              <a:t>Try downloading the Boston Marathon data from the GitHub folder.  We want to end up with each column as a vector that is named according to the top row of the file for that column.  This will make it easier to work with the data in MATLAB. </a:t>
             </a:r>
           </a:p>
         </p:txBody>
       </p:sp>
       <p:pic>
         <p:nvPicPr>
-          <p:cNvPr id="4" name="Picture 3"/>
+          <p:cNvPr id="5" name="Picture 4"/>
           <p:cNvPicPr>
             <a:picLocks noChangeAspect="1"/>
           </p:cNvPicPr>
           <p:nvPr/>
         </p:nvPicPr>
-        <p:blipFill>
-          <a:blip r:embed="rId2"/>
-          <a:stretch>
-            <a:fillRect/>
-          </a:stretch>
+        <p:blipFill rotWithShape="1">
+          <a:blip r:embed="rId3"/>
+          <a:srcRect b="28414"/>
+          <a:stretch/>
         </p:blipFill>
         <p:spPr>
           <a:xfrm>
-            <a:off x="8426846" y="2743875"/>
-            <a:ext cx="2282170" cy="3835231"/>
+            <a:off x="6311426" y="4353312"/>
+            <a:ext cx="5605591" cy="1607407"/>
           </a:xfrm>
           <a:prstGeom prst="rect">
             <a:avLst/>
@@ -3319,14 +3377,14 @@
       </p:pic>
       <p:sp>
         <p:nvSpPr>
-          <p:cNvPr id="5" name="TextBox 4"/>
+          <p:cNvPr id="6" name="TextBox 5"/>
           <p:cNvSpPr txBox="1"/>
           <p:nvPr/>
         </p:nvSpPr>
         <p:spPr>
           <a:xfrm>
-            <a:off x="314630" y="3122579"/>
-            <a:ext cx="7161956" cy="1846659"/>
+            <a:off x="10175835" y="3206133"/>
+            <a:ext cx="1741182" cy="369332"/>
           </a:xfrm>
           <a:prstGeom prst="rect">
             <a:avLst/>
@@ -3334,174 +3392,60 @@
           <a:noFill/>
         </p:spPr>
         <p:txBody>
-          <a:bodyPr wrap="square" rtlCol="0">
+          <a:bodyPr wrap="none" rtlCol="0">
             <a:spAutoFit/>
           </a:bodyPr>
           <a:lstStyle/>
           <a:p>
             <a:r>
-              <a:rPr lang="en-US" sz="1600" b="1" u="sng" dirty="0"/>
-              <a:t>Explanation of Data Labels</a:t>
-            </a:r>
-          </a:p>
-          <a:p>
-            <a:pPr lvl="1"/>
-            <a:r>
-              <a:rPr lang="en-US" sz="1400" dirty="0"/>
-              <a:t>Age – Runner’s Age</a:t>
-            </a:r>
-          </a:p>
-          <a:p>
-            <a:pPr lvl="1"/>
-            <a:r>
-              <a:rPr lang="en-US" sz="1400" dirty="0"/>
-              <a:t>Bib – Runners Bib Number (w# is for wheel chair athletes)</a:t>
-            </a:r>
-          </a:p>
-          <a:p>
-            <a:pPr lvl="1"/>
-            <a:r>
-              <a:rPr lang="en-US" sz="1400" dirty="0" err="1"/>
-              <a:t>Divisionplace</a:t>
-            </a:r>
-            <a:r>
-              <a:rPr lang="en-US" sz="1400" dirty="0"/>
-              <a:t> – Place in their division (age, gender, mobility)</a:t>
-            </a:r>
-            <a:endParaRPr lang="en-US" sz="1400" dirty="0"/>
-          </a:p>
-          <a:p>
-            <a:pPr lvl="1"/>
-            <a:r>
-              <a:rPr lang="en-US" sz="1400" dirty="0"/>
-              <a:t>City – City of Origin</a:t>
-            </a:r>
-          </a:p>
-          <a:p>
-            <a:pPr lvl="1"/>
-            <a:r>
-              <a:rPr lang="en-US" sz="1400" dirty="0"/>
-              <a:t>Country – Country of Residence</a:t>
-            </a:r>
-          </a:p>
-          <a:p>
-            <a:pPr lvl="1"/>
-            <a:r>
-              <a:rPr lang="en-US" sz="1400" dirty="0" err="1"/>
-              <a:t>Ctz</a:t>
-            </a:r>
-            <a:r>
-              <a:rPr lang="en-US" sz="1400" dirty="0"/>
-              <a:t> - Citizenship</a:t>
-            </a:r>
-          </a:p>
-          <a:p>
-            <a:pPr lvl="1"/>
-            <a:r>
-              <a:rPr lang="en-US" sz="1400" dirty="0"/>
-              <a:t>Gender – Male or Female</a:t>
-            </a:r>
-          </a:p>
-        </p:txBody>
-      </p:sp>
-      <p:sp>
-        <p:nvSpPr>
-          <p:cNvPr id="6" name="Rectangle 5"/>
-          <p:cNvSpPr/>
+              <a:rPr lang="en-US" dirty="0"/>
+              <a:t>Import Selection</a:t>
+            </a:r>
+          </a:p>
+        </p:txBody>
+      </p:sp>
+      <p:cxnSp>
+        <p:nvCxnSpPr>
+          <p:cNvPr id="7" name="Straight Arrow Connector 6"/>
+          <p:cNvCxnSpPr>
+            <a:stCxn id="6" idx="2"/>
+          </p:cNvCxnSpPr>
           <p:nvPr/>
-        </p:nvSpPr>
-        <p:spPr>
-          <a:xfrm>
-            <a:off x="3125822" y="4300631"/>
-            <a:ext cx="6096000" cy="1815882"/>
-          </a:xfrm>
-          <a:prstGeom prst="rect">
+        </p:nvCxnSpPr>
+        <p:spPr>
+          <a:xfrm>
+            <a:off x="11046426" y="3575465"/>
+            <a:ext cx="383574" cy="777847"/>
+          </a:xfrm>
+          <a:prstGeom prst="straightConnector1">
             <a:avLst/>
           </a:prstGeom>
-        </p:spPr>
-        <p:txBody>
-          <a:bodyPr>
-            <a:spAutoFit/>
-          </a:bodyPr>
-          <a:lstStyle/>
-          <a:p>
-            <a:pPr lvl="1"/>
-            <a:r>
-              <a:rPr lang="en-US" sz="1400" dirty="0" err="1"/>
-              <a:t>Genderplace</a:t>
-            </a:r>
-            <a:r>
-              <a:rPr lang="en-US" sz="1400" dirty="0"/>
-              <a:t> – Overall Place for their Gender</a:t>
-            </a:r>
-          </a:p>
-          <a:p>
-            <a:pPr lvl="1"/>
-            <a:r>
-              <a:rPr lang="en-US" sz="1400" dirty="0"/>
-              <a:t>Halftime -  Half Marathon Time</a:t>
-            </a:r>
-          </a:p>
-          <a:p>
-            <a:pPr lvl="1"/>
-            <a:r>
-              <a:rPr lang="en-US" sz="1400" dirty="0" err="1"/>
-              <a:t>Milepace</a:t>
-            </a:r>
-            <a:r>
-              <a:rPr lang="en-US" sz="1400" dirty="0"/>
-              <a:t> – Average Mile time for the full marathon</a:t>
-            </a:r>
-          </a:p>
-          <a:p>
-            <a:pPr lvl="1"/>
-            <a:r>
-              <a:rPr lang="en-US" sz="1400" dirty="0"/>
-              <a:t>Name – Runner’s Name</a:t>
-            </a:r>
-          </a:p>
-          <a:p>
-            <a:pPr lvl="1"/>
-            <a:r>
-              <a:rPr lang="en-US" sz="1400" dirty="0" err="1"/>
-              <a:t>Officialtime</a:t>
-            </a:r>
-            <a:r>
-              <a:rPr lang="en-US" sz="1400" dirty="0"/>
-              <a:t> – Full Marathon Time (26.2 miles)</a:t>
-            </a:r>
-          </a:p>
-          <a:p>
-            <a:pPr lvl="1"/>
-            <a:r>
-              <a:rPr lang="en-US" sz="1400" dirty="0" err="1"/>
-              <a:t>Overallplace</a:t>
-            </a:r>
-            <a:r>
-              <a:rPr lang="en-US" sz="1400" dirty="0"/>
-              <a:t> – What place did they come in</a:t>
-            </a:r>
-          </a:p>
-          <a:p>
-            <a:pPr lvl="1"/>
-            <a:r>
-              <a:rPr lang="en-US" sz="1400" dirty="0"/>
-              <a:t>State – State of Residence</a:t>
-            </a:r>
-          </a:p>
-          <a:p>
-            <a:pPr lvl="1"/>
-            <a:r>
-              <a:rPr lang="en-US" sz="1400" dirty="0"/>
-              <a:t>Time[X]k – split at X kilometers through the race</a:t>
-            </a:r>
-          </a:p>
-        </p:txBody>
-      </p:sp>
+          <a:ln w="38100">
+            <a:solidFill>
+              <a:schemeClr val="tx1"/>
+            </a:solidFill>
+            <a:tailEnd type="triangle"/>
+          </a:ln>
+        </p:spPr>
+        <p:style>
+          <a:lnRef idx="1">
+            <a:schemeClr val="accent1"/>
+          </a:lnRef>
+          <a:fillRef idx="0">
+            <a:schemeClr val="accent1"/>
+          </a:fillRef>
+          <a:effectRef idx="0">
+            <a:schemeClr val="accent1"/>
+          </a:effectRef>
+          <a:fontRef idx="minor">
+            <a:schemeClr val="tx1"/>
+          </a:fontRef>
+        </p:style>
+      </p:cxnSp>
     </p:spTree>
     <p:extLst>
       <p:ext uri="{BB962C8B-B14F-4D97-AF65-F5344CB8AC3E}">
-        <p14:creationId xmlns:p14="http://schemas.microsoft.com/office/powerpoint/2010/main" val="4283949246"/>
+        <p14:creationId xmlns:p14="http://schemas.microsoft.com/office/powerpoint/2010/main" val="1081705465"/>
       </p:ext>
     </p:extLst>
   </p:cSld>
@@ -3538,7 +3482,12 @@
             <p:ph type="title"/>
           </p:nvPr>
         </p:nvSpPr>
-        <p:spPr/>
+        <p:spPr>
+          <a:xfrm>
+            <a:off x="121046" y="-109712"/>
+            <a:ext cx="10515600" cy="1325563"/>
+          </a:xfrm>
+        </p:spPr>
         <p:txBody>
           <a:bodyPr/>
           <a:lstStyle/>
@@ -3562,8 +3511,8 @@
         </p:nvSpPr>
         <p:spPr>
           <a:xfrm>
-            <a:off x="569670" y="1525317"/>
-            <a:ext cx="11191070" cy="1675083"/>
+            <a:off x="286456" y="1022571"/>
+            <a:ext cx="11191070" cy="1431891"/>
           </a:xfrm>
         </p:spPr>
         <p:txBody>
@@ -3576,77 +3525,41 @@
               <a:buNone/>
             </a:pPr>
             <a:r>
-              <a:rPr lang="en-US" dirty="0"/>
-              <a:t>As the last step, we will explore different plotting functions using some test data.  The test data set is the 2014 Boston Marathon Results.  The original data can be found on </a:t>
-            </a:r>
-            <a:r>
-              <a:rPr lang="en-US" dirty="0" err="1"/>
+              <a:rPr lang="en-US" sz="2400" dirty="0"/>
+              <a:t>As the last step, we will explore different plotting functions using the 2014 Boston Marathon Results.  The original data can be found on </a:t>
+            </a:r>
+            <a:r>
+              <a:rPr lang="en-US" sz="2400" dirty="0" err="1"/>
               <a:t>Git</a:t>
             </a:r>
             <a:r>
-              <a:rPr lang="en-US" dirty="0"/>
+              <a:rPr lang="en-US" sz="2400" dirty="0"/>
               <a:t> Hub </a:t>
             </a:r>
             <a:r>
-              <a:rPr lang="en-US" dirty="0">
+              <a:rPr lang="en-US" sz="2400" dirty="0">
                 <a:hlinkClick r:id="rId2"/>
               </a:rPr>
               <a:t>here</a:t>
             </a:r>
             <a:r>
-              <a:rPr lang="en-US" dirty="0"/>
-              <a:t>, but a cleaner version is in the </a:t>
-            </a:r>
-            <a:r>
-              <a:rPr lang="en-US" dirty="0" err="1"/>
-              <a:t>Matlab</a:t>
-            </a:r>
-            <a:r>
-              <a:rPr lang="en-US" dirty="0"/>
-              <a:t> Intro Folder.</a:t>
-            </a:r>
-          </a:p>
-        </p:txBody>
-      </p:sp>
-      <p:sp>
-        <p:nvSpPr>
-          <p:cNvPr id="9" name="Rectangle 8"/>
-          <p:cNvSpPr/>
-          <p:nvPr/>
-        </p:nvSpPr>
-        <p:spPr>
-          <a:xfrm>
-            <a:off x="264267" y="3573449"/>
-            <a:ext cx="7428689" cy="923330"/>
-          </a:xfrm>
-          <a:prstGeom prst="rect">
-            <a:avLst/>
-          </a:prstGeom>
-        </p:spPr>
-        <p:txBody>
-          <a:bodyPr wrap="square">
-            <a:spAutoFit/>
-          </a:bodyPr>
-          <a:lstStyle/>
-          <a:p>
-            <a:r>
-              <a:rPr lang="en-US" b="1" i="1" dirty="0"/>
-              <a:t>Try to import the Boston Marathon results into </a:t>
-            </a:r>
-            <a:r>
-              <a:rPr lang="en-US" b="1" i="1" dirty="0" err="1"/>
-              <a:t>Matlab</a:t>
-            </a:r>
-            <a:r>
-              <a:rPr lang="en-US" b="1" i="1" dirty="0"/>
-              <a:t> and make some plots that provide some insight into the results of the Boston Marathon.  Here are some examples to get you thinking</a:t>
+              <a:rPr lang="en-US" sz="2400" dirty="0"/>
+              <a:t>, but a cleaner version is in the MATLAB Intro Folder on </a:t>
+            </a:r>
+            <a:r>
+              <a:rPr lang="en-US" sz="2400" dirty="0" err="1"/>
+              <a:t>Git</a:t>
+            </a:r>
+            <a:r>
+              <a:rPr lang="en-US" sz="2400" dirty="0"/>
+              <a:t> Hub.</a:t>
             </a:r>
           </a:p>
         </p:txBody>
       </p:sp>
       <p:pic>
         <p:nvPicPr>
-          <p:cNvPr id="13" name="Picture 12"/>
+          <p:cNvPr id="4" name="Picture 3"/>
           <p:cNvPicPr>
             <a:picLocks noChangeAspect="1"/>
           </p:cNvPicPr>
@@ -3660,8 +3573,194 @@
         </p:blipFill>
         <p:spPr>
           <a:xfrm>
-            <a:off x="8072230" y="3268679"/>
-            <a:ext cx="3281570" cy="2694244"/>
+            <a:off x="5331318" y="2429672"/>
+            <a:ext cx="2282170" cy="3835231"/>
+          </a:xfrm>
+          <a:prstGeom prst="rect">
+            <a:avLst/>
+          </a:prstGeom>
+        </p:spPr>
+      </p:pic>
+      <p:sp>
+        <p:nvSpPr>
+          <p:cNvPr id="5" name="TextBox 4"/>
+          <p:cNvSpPr txBox="1"/>
+          <p:nvPr/>
+        </p:nvSpPr>
+        <p:spPr>
+          <a:xfrm>
+            <a:off x="86133" y="2454462"/>
+            <a:ext cx="5092980" cy="3785652"/>
+          </a:xfrm>
+          <a:prstGeom prst="rect">
+            <a:avLst/>
+          </a:prstGeom>
+          <a:noFill/>
+        </p:spPr>
+        <p:txBody>
+          <a:bodyPr wrap="square" rtlCol="0">
+            <a:spAutoFit/>
+          </a:bodyPr>
+          <a:lstStyle/>
+          <a:p>
+            <a:r>
+              <a:rPr lang="en-US" sz="1600" b="1" u="sng" dirty="0"/>
+              <a:t>Explanation of Data Labels</a:t>
+            </a:r>
+          </a:p>
+          <a:p>
+            <a:pPr lvl="1"/>
+            <a:r>
+              <a:rPr lang="en-US" sz="1400" dirty="0"/>
+              <a:t>Age – Runner’s Age</a:t>
+            </a:r>
+          </a:p>
+          <a:p>
+            <a:pPr lvl="1"/>
+            <a:r>
+              <a:rPr lang="en-US" sz="1400" dirty="0"/>
+              <a:t>Bib – Runners Bib Number (w# is for wheel chair athletes)</a:t>
+            </a:r>
+          </a:p>
+          <a:p>
+            <a:pPr lvl="1"/>
+            <a:r>
+              <a:rPr lang="en-US" sz="1400" dirty="0" err="1"/>
+              <a:t>Divisionplace</a:t>
+            </a:r>
+            <a:r>
+              <a:rPr lang="en-US" sz="1400" dirty="0"/>
+              <a:t> – Place in their division (age, gender, mobility)</a:t>
+            </a:r>
+          </a:p>
+          <a:p>
+            <a:pPr lvl="1"/>
+            <a:r>
+              <a:rPr lang="en-US" sz="1400" dirty="0"/>
+              <a:t>City – City of Origin</a:t>
+            </a:r>
+          </a:p>
+          <a:p>
+            <a:pPr lvl="1"/>
+            <a:r>
+              <a:rPr lang="en-US" sz="1400" dirty="0"/>
+              <a:t>Country – Country of Residence</a:t>
+            </a:r>
+          </a:p>
+          <a:p>
+            <a:pPr lvl="1"/>
+            <a:r>
+              <a:rPr lang="en-US" sz="1400" dirty="0" err="1"/>
+              <a:t>Ctz</a:t>
+            </a:r>
+            <a:r>
+              <a:rPr lang="en-US" sz="1400" dirty="0"/>
+              <a:t> - Citizenship</a:t>
+            </a:r>
+          </a:p>
+          <a:p>
+            <a:pPr lvl="1"/>
+            <a:r>
+              <a:rPr lang="en-US" sz="1400" dirty="0"/>
+              <a:t>Gender – Male or Female</a:t>
+            </a:r>
+          </a:p>
+          <a:p>
+            <a:pPr lvl="1"/>
+            <a:r>
+              <a:rPr lang="en-US" sz="1400" dirty="0" err="1"/>
+              <a:t>Genderplace</a:t>
+            </a:r>
+            <a:r>
+              <a:rPr lang="en-US" sz="1400" dirty="0"/>
+              <a:t> – Overall Place for their Gender</a:t>
+            </a:r>
+          </a:p>
+          <a:p>
+            <a:pPr lvl="1"/>
+            <a:r>
+              <a:rPr lang="en-US" sz="1400" dirty="0"/>
+              <a:t>Halftime -  Half Marathon Time</a:t>
+            </a:r>
+          </a:p>
+          <a:p>
+            <a:pPr lvl="1"/>
+            <a:r>
+              <a:rPr lang="en-US" sz="1400" dirty="0" err="1"/>
+              <a:t>Milepace</a:t>
+            </a:r>
+            <a:r>
+              <a:rPr lang="en-US" sz="1400" dirty="0"/>
+              <a:t> – Average Mile time for the full marathon</a:t>
+            </a:r>
+          </a:p>
+          <a:p>
+            <a:pPr lvl="1"/>
+            <a:r>
+              <a:rPr lang="en-US" sz="1400" dirty="0"/>
+              <a:t>Name – Runner’s Name</a:t>
+            </a:r>
+          </a:p>
+          <a:p>
+            <a:pPr lvl="1"/>
+            <a:r>
+              <a:rPr lang="en-US" sz="1400" dirty="0" err="1"/>
+              <a:t>Officialtime</a:t>
+            </a:r>
+            <a:r>
+              <a:rPr lang="en-US" sz="1400" dirty="0"/>
+              <a:t> – Full Marathon Time (26.2 miles)</a:t>
+            </a:r>
+          </a:p>
+          <a:p>
+            <a:pPr lvl="1"/>
+            <a:r>
+              <a:rPr lang="en-US" sz="1400" dirty="0" err="1"/>
+              <a:t>Overallplace</a:t>
+            </a:r>
+            <a:r>
+              <a:rPr lang="en-US" sz="1400" dirty="0"/>
+              <a:t> – What place did they come in</a:t>
+            </a:r>
+          </a:p>
+          <a:p>
+            <a:pPr lvl="1"/>
+            <a:r>
+              <a:rPr lang="en-US" sz="1400" dirty="0"/>
+              <a:t>State – State of Residence</a:t>
+            </a:r>
+          </a:p>
+          <a:p>
+            <a:pPr lvl="1"/>
+            <a:r>
+              <a:rPr lang="en-US" sz="1400" dirty="0"/>
+              <a:t>Time[X]k – split at X kilometers through the race</a:t>
+            </a:r>
+          </a:p>
+          <a:p>
+            <a:pPr lvl="1"/>
+            <a:endParaRPr lang="en-US" sz="1400" dirty="0"/>
+          </a:p>
+        </p:txBody>
+      </p:sp>
+      <p:pic>
+        <p:nvPicPr>
+          <p:cNvPr id="7" name="Picture 6"/>
+          <p:cNvPicPr>
+            <a:picLocks noChangeAspect="1"/>
+          </p:cNvPicPr>
+          <p:nvPr/>
+        </p:nvPicPr>
+        <p:blipFill>
+          <a:blip r:embed="rId4"/>
+          <a:stretch>
+            <a:fillRect/>
+          </a:stretch>
+        </p:blipFill>
+        <p:spPr>
+          <a:xfrm>
+            <a:off x="8361426" y="2211946"/>
+            <a:ext cx="2854565" cy="2343663"/>
           </a:xfrm>
           <a:prstGeom prst="rect">
             <a:avLst/>
@@ -3673,10 +3772,38 @@
           </a:ln>
         </p:spPr>
       </p:pic>
+      <p:sp>
+        <p:nvSpPr>
+          <p:cNvPr id="8" name="Rectangle 7"/>
+          <p:cNvSpPr/>
+          <p:nvPr/>
+        </p:nvSpPr>
+        <p:spPr>
+          <a:xfrm>
+            <a:off x="7875023" y="4951539"/>
+            <a:ext cx="4099724" cy="1200329"/>
+          </a:xfrm>
+          <a:prstGeom prst="rect">
+            <a:avLst/>
+          </a:prstGeom>
+        </p:spPr>
+        <p:txBody>
+          <a:bodyPr wrap="square">
+            <a:spAutoFit/>
+          </a:bodyPr>
+          <a:lstStyle/>
+          <a:p>
+            <a:r>
+              <a:rPr lang="en-US" b="1" i="1" dirty="0"/>
+              <a:t>Try to use MATLAB to make some plots that provide insight into the results of the Boston Marathon.  Here are some examples to get you thinking.</a:t>
+            </a:r>
+          </a:p>
+        </p:txBody>
+      </p:sp>
     </p:spTree>
     <p:extLst>
       <p:ext uri="{BB962C8B-B14F-4D97-AF65-F5344CB8AC3E}">
-        <p14:creationId xmlns:p14="http://schemas.microsoft.com/office/powerpoint/2010/main" val="3552595031"/>
+        <p14:creationId xmlns:p14="http://schemas.microsoft.com/office/powerpoint/2010/main" val="4283949246"/>
       </p:ext>
     </p:extLst>
   </p:cSld>
@@ -3833,12 +3960,17 @@
         </p:blipFill>
         <p:spPr>
           <a:xfrm>
-            <a:off x="462563" y="2510320"/>
-            <a:ext cx="3869945" cy="3177313"/>
+            <a:off x="736586" y="2750596"/>
+            <a:ext cx="3284637" cy="2696762"/>
           </a:xfrm>
           <a:prstGeom prst="rect">
             <a:avLst/>
           </a:prstGeom>
+          <a:ln>
+            <a:solidFill>
+              <a:schemeClr val="tx1"/>
+            </a:solidFill>
+          </a:ln>
         </p:spPr>
       </p:pic>
       <p:grpSp>
@@ -3849,10 +3981,10 @@
         </p:nvGrpSpPr>
         <p:grpSpPr>
           <a:xfrm>
-            <a:off x="940448" y="4738933"/>
-            <a:ext cx="10039085" cy="1573999"/>
-            <a:chOff x="940448" y="4738933"/>
-            <a:chExt cx="10039085" cy="1573999"/>
+            <a:off x="1058831" y="4738933"/>
+            <a:ext cx="10201352" cy="1573999"/>
+            <a:chOff x="1112440" y="4738933"/>
+            <a:chExt cx="10201352" cy="1573999"/>
           </a:xfrm>
         </p:grpSpPr>
         <p:sp>
@@ -3864,7 +3996,7 @@
           <p:spPr>
             <a:xfrm>
               <a:off x="7771732" y="5943600"/>
-              <a:ext cx="3207801" cy="369332"/>
+              <a:ext cx="3542060" cy="369332"/>
             </a:xfrm>
             <a:prstGeom prst="rect">
               <a:avLst/>
@@ -3879,7 +4011,7 @@
             <a:p>
               <a:r>
                 <a:rPr lang="en-US" dirty="0"/>
-                <a:t>What are  these outliers due to?</a:t>
+                <a:t>What are  these outliers a result of?</a:t>
               </a:r>
             </a:p>
           </p:txBody>
@@ -4020,7 +4152,7 @@
           </p:nvSpPr>
           <p:spPr>
             <a:xfrm>
-              <a:off x="940448" y="5204167"/>
+              <a:off x="1112440" y="4995021"/>
               <a:ext cx="547992" cy="243191"/>
             </a:xfrm>
             <a:prstGeom prst="ellipse">
@@ -4066,7 +4198,7 @@
           </p:nvCxnSpPr>
           <p:spPr>
             <a:xfrm flipH="1" flipV="1">
-              <a:off x="1660432" y="5447358"/>
+              <a:off x="1677776" y="5199462"/>
               <a:ext cx="5729591" cy="680908"/>
             </a:xfrm>
             <a:prstGeom prst="straightConnector1">
@@ -4290,24 +4422,15 @@
           </a:p>
           <a:p>
             <a:r>
-              <a:rPr lang="en-US" dirty="0" err="1"/>
-              <a:t>Matlab</a:t>
-            </a:r>
-            <a:r>
-              <a:rPr lang="en-US" dirty="0"/>
-              <a:t> loaded on a computer</a:t>
-            </a:r>
-          </a:p>
-          <a:p>
-            <a:r>
-              <a:rPr lang="en-US" dirty="0"/>
-              <a:t>No prior experience with </a:t>
-            </a:r>
-            <a:r>
-              <a:rPr lang="en-US" dirty="0" err="1"/>
-              <a:t>Matlab</a:t>
-            </a:r>
-            <a:endParaRPr lang="en-US" dirty="0"/>
+              <a:rPr lang="en-US" dirty="0"/>
+              <a:t>MATLAB loaded on a computer</a:t>
+            </a:r>
+          </a:p>
+          <a:p>
+            <a:r>
+              <a:rPr lang="en-US" dirty="0"/>
+              <a:t>No prior experience with MATLAB</a:t>
+            </a:r>
           </a:p>
           <a:p>
             <a:pPr marL="0" indent="0">
@@ -4327,15 +4450,7 @@
           <a:p>
             <a:r>
               <a:rPr lang="en-US" dirty="0"/>
-              <a:t>Operate in the </a:t>
-            </a:r>
-            <a:r>
-              <a:rPr lang="en-US" dirty="0" err="1"/>
-              <a:t>Matlab</a:t>
-            </a:r>
-            <a:r>
-              <a:rPr lang="en-US" dirty="0"/>
-              <a:t> Environment</a:t>
+              <a:t>Operate in the MATLAB Environment</a:t>
             </a:r>
           </a:p>
           <a:p>
@@ -4390,7 +4505,7 @@
         <p:spPr>
           <a:xfrm>
             <a:off x="8289267" y="1434316"/>
-            <a:ext cx="1805494" cy="369332"/>
+            <a:ext cx="2306722" cy="369332"/>
           </a:xfrm>
           <a:prstGeom prst="rect">
             <a:avLst/>
@@ -4405,7 +4520,7 @@
           <a:p>
             <a:r>
               <a:rPr lang="en-US" dirty="0"/>
-              <a:t>Where do I type?</a:t>
+              <a:t>From where do I type?</a:t>
             </a:r>
           </a:p>
         </p:txBody>
@@ -4448,7 +4563,7 @@
         <p:spPr>
           <a:xfrm>
             <a:off x="8289267" y="3637812"/>
-            <a:ext cx="1272849" cy="369332"/>
+            <a:ext cx="1604991" cy="369332"/>
           </a:xfrm>
           <a:prstGeom prst="rect">
             <a:avLst/>
@@ -4463,7 +4578,7 @@
           <a:p>
             <a:r>
               <a:rPr lang="en-US" dirty="0"/>
-              <a:t>Plot Master</a:t>
+              <a:t>To plot master!</a:t>
             </a:r>
           </a:p>
         </p:txBody>
@@ -4551,16 +4666,10 @@
               <a:buNone/>
             </a:pPr>
             <a:r>
-              <a:rPr lang="en-US" u="sng" dirty="0" err="1">
-                <a:hlinkClick r:id="rId2"/>
-              </a:rPr>
-              <a:t>Matlab</a:t>
-            </a:r>
-            <a:r>
               <a:rPr lang="en-US" u="sng" dirty="0">
                 <a:hlinkClick r:id="rId2"/>
               </a:rPr>
-              <a:t> Documentation</a:t>
+              <a:t>MATLAB Documentation</a:t>
             </a:r>
             <a:endParaRPr lang="en-US" u="sng" dirty="0"/>
           </a:p>
@@ -4568,15 +4677,7 @@
             <a:pPr lvl="1"/>
             <a:r>
               <a:rPr lang="en-US" dirty="0"/>
-              <a:t>Easiest to find through a Google search of “</a:t>
-            </a:r>
-            <a:r>
-              <a:rPr lang="en-US" dirty="0" err="1"/>
-              <a:t>Matlab</a:t>
-            </a:r>
-            <a:r>
-              <a:rPr lang="en-US" dirty="0"/>
-              <a:t> + command”</a:t>
+              <a:t>Easiest to find through a Google search of “MATLAB + command”</a:t>
             </a:r>
           </a:p>
           <a:p>
@@ -4601,13 +4702,7 @@
               <a:rPr lang="en-US" u="sng" dirty="0">
                 <a:hlinkClick r:id="rId3"/>
               </a:rPr>
-              <a:t>BYU Intro to </a:t>
-            </a:r>
-            <a:r>
-              <a:rPr lang="en-US" u="sng" dirty="0" err="1">
-                <a:hlinkClick r:id="rId3"/>
-              </a:rPr>
-              <a:t>Matlab</a:t>
+              <a:t>BYU Intro to MATLAB</a:t>
             </a:r>
             <a:endParaRPr lang="en-US" u="sng" dirty="0"/>
           </a:p>
@@ -4731,13 +4826,8 @@
           <a:p>
             <a:r>
               <a:rPr lang="en-US" dirty="0"/>
-              <a:t>When you open </a:t>
-            </a:r>
-            <a:r>
-              <a:rPr lang="en-US" dirty="0" err="1"/>
-              <a:t>Matlab</a:t>
-            </a:r>
-            <a:endParaRPr lang="en-US" dirty="0"/>
+              <a:t>When you open MATLAB</a:t>
+            </a:r>
           </a:p>
         </p:txBody>
       </p:sp>
@@ -4779,15 +4869,7 @@
             <a:pPr lvl="1"/>
             <a:r>
               <a:rPr lang="en-US" dirty="0"/>
-              <a:t>This is also </a:t>
-            </a:r>
-            <a:r>
-              <a:rPr lang="en-US" dirty="0" err="1"/>
-              <a:t>wthe</a:t>
-            </a:r>
-            <a:r>
-              <a:rPr lang="en-US" dirty="0"/>
-              <a:t> GUI for plots and apps</a:t>
+              <a:t>This is also the GUI* for plots and apps</a:t>
             </a:r>
           </a:p>
           <a:p>
@@ -5071,6 +5153,35 @@
                 <a:srgbClr val="FF0000"/>
               </a:solidFill>
             </a:endParaRPr>
+          </a:p>
+        </p:txBody>
+      </p:sp>
+      <p:sp>
+        <p:nvSpPr>
+          <p:cNvPr id="5" name="TextBox 4"/>
+          <p:cNvSpPr txBox="1"/>
+          <p:nvPr/>
+        </p:nvSpPr>
+        <p:spPr>
+          <a:xfrm>
+            <a:off x="5593404" y="6116706"/>
+            <a:ext cx="3136051" cy="369332"/>
+          </a:xfrm>
+          <a:prstGeom prst="rect">
+            <a:avLst/>
+          </a:prstGeom>
+          <a:noFill/>
+        </p:spPr>
+        <p:txBody>
+          <a:bodyPr wrap="none" rtlCol="0">
+            <a:spAutoFit/>
+          </a:bodyPr>
+          <a:lstStyle/>
+          <a:p>
+            <a:r>
+              <a:rPr lang="en-US" dirty="0"/>
+              <a:t>*GUI = Graphical User Interface</a:t>
+            </a:r>
           </a:p>
         </p:txBody>
       </p:sp>
@@ -5114,20 +5225,20 @@
             <p:ph type="title"/>
           </p:nvPr>
         </p:nvSpPr>
-        <p:spPr/>
+        <p:spPr>
+          <a:xfrm>
+            <a:off x="259944" y="24666"/>
+            <a:ext cx="10515600" cy="1325563"/>
+          </a:xfrm>
+        </p:spPr>
         <p:txBody>
           <a:bodyPr/>
           <a:lstStyle/>
           <a:p>
             <a:r>
               <a:rPr lang="en-US" dirty="0"/>
-              <a:t>Playing with Variables in </a:t>
-            </a:r>
-            <a:r>
-              <a:rPr lang="en-US" dirty="0" err="1"/>
-              <a:t>Matlab</a:t>
-            </a:r>
-            <a:endParaRPr lang="en-US" dirty="0"/>
+              <a:t>Playing with Variables in MATLAB</a:t>
+            </a:r>
           </a:p>
         </p:txBody>
       </p:sp>
@@ -5143,13 +5254,13 @@
         </p:nvSpPr>
         <p:spPr>
           <a:xfrm>
-            <a:off x="316927" y="1622264"/>
-            <a:ext cx="10515600" cy="4351338"/>
+            <a:off x="259944" y="1783892"/>
+            <a:ext cx="10515600" cy="4320233"/>
           </a:xfrm>
         </p:spPr>
         <p:txBody>
           <a:bodyPr>
-            <a:normAutofit fontScale="77500" lnSpcReduction="20000"/>
+            <a:normAutofit fontScale="62500" lnSpcReduction="20000"/>
           </a:bodyPr>
           <a:lstStyle/>
           <a:p>
@@ -5200,6 +5311,12 @@
           <a:p>
             <a:r>
               <a:rPr lang="en-US" dirty="0"/>
+              <a:t>Creating a long matrix without typing it out</a:t>
+            </a:r>
+          </a:p>
+          <a:p>
+            <a:r>
+              <a:rPr lang="en-US" dirty="0"/>
               <a:t>Accessing an element of a matrix</a:t>
             </a:r>
           </a:p>
@@ -5212,7 +5329,7 @@
           <a:p>
             <a:r>
               <a:rPr lang="en-US" dirty="0"/>
-              <a:t> What does adding a “;” at the end of a line do?</a:t>
+              <a:t>What does adding a “;” at the end of a line do?</a:t>
             </a:r>
           </a:p>
           <a:p>
@@ -5253,7 +5370,7 @@
         </p:blipFill>
         <p:spPr>
           <a:xfrm>
-            <a:off x="5214212" y="2902059"/>
+            <a:off x="5517744" y="2814348"/>
             <a:ext cx="3737160" cy="917762"/>
           </a:xfrm>
           <a:prstGeom prst="rect">
@@ -5484,7 +5601,7 @@
         </p:blipFill>
         <p:spPr>
           <a:xfrm>
-            <a:off x="6513638" y="3973707"/>
+            <a:off x="6590012" y="4020541"/>
             <a:ext cx="889085" cy="1041500"/>
           </a:xfrm>
           <a:prstGeom prst="rect">
@@ -5513,7 +5630,7 @@
         </p:blipFill>
         <p:spPr>
           <a:xfrm>
-            <a:off x="7699560" y="4044407"/>
+            <a:off x="7748274" y="4813934"/>
             <a:ext cx="1907629" cy="911423"/>
           </a:xfrm>
           <a:prstGeom prst="rect">
@@ -5591,6 +5708,35 @@
           </a:p>
         </p:txBody>
       </p:sp>
+      <p:pic>
+        <p:nvPicPr>
+          <p:cNvPr id="4" name="Picture 3"/>
+          <p:cNvPicPr>
+            <a:picLocks noChangeAspect="1"/>
+          </p:cNvPicPr>
+          <p:nvPr/>
+        </p:nvPicPr>
+        <p:blipFill>
+          <a:blip r:embed="rId13"/>
+          <a:stretch>
+            <a:fillRect/>
+          </a:stretch>
+        </p:blipFill>
+        <p:spPr>
+          <a:xfrm>
+            <a:off x="7748274" y="3913025"/>
+            <a:ext cx="1926452" cy="746374"/>
+          </a:xfrm>
+          <a:prstGeom prst="rect">
+            <a:avLst/>
+          </a:prstGeom>
+          <a:ln>
+            <a:solidFill>
+              <a:schemeClr val="tx1"/>
+            </a:solidFill>
+          </a:ln>
+        </p:spPr>
+      </p:pic>
     </p:spTree>
     <p:extLst>
       <p:ext uri="{BB962C8B-B14F-4D97-AF65-F5344CB8AC3E}">
@@ -5916,15 +6062,7 @@
           <a:p>
             <a:r>
               <a:rPr lang="en-US" dirty="0"/>
-              <a:t>You can write </a:t>
-            </a:r>
-            <a:r>
-              <a:rPr lang="en-US" dirty="0" err="1"/>
-              <a:t>Matlab</a:t>
-            </a:r>
-            <a:r>
-              <a:rPr lang="en-US" dirty="0"/>
-              <a:t> code into a file and save it as a .m file.  This makes it easier to write and debut larger programs without using the command line.  The interface in the script editor also makes it easier to write clean and functional code.</a:t>
+              <a:t>You can write MATLAB code into a file and save it as a .m file.  This makes it easier to write and debut larger programs without using the command line.  The interface in the script editor also makes it easier to write clean and functional code.</a:t>
             </a:r>
           </a:p>
         </p:txBody>
@@ -6315,13 +6453,8 @@
           <a:p>
             <a:r>
               <a:rPr lang="en-US" b="1" i="1" dirty="0"/>
-              <a:t>Then try to plot them on a 2D plot.  It should include axis labels and </a:t>
-            </a:r>
-            <a:r>
-              <a:rPr lang="en-US" b="1" i="1" dirty="0"/>
-              <a:t>a title like in the examples (on the right)</a:t>
-            </a:r>
-            <a:endParaRPr lang="en-US" b="1" i="1" dirty="0"/>
+              <a:t>Then try to plot them on a 2D plot.  It should include axis labels and a title like in the examples (on the right)</a:t>
+            </a:r>
           </a:p>
           <a:p>
             <a:endParaRPr lang="en-US" b="1" i="1" dirty="0"/>
@@ -6350,7 +6483,7 @@
         </p:blipFill>
         <p:spPr>
           <a:xfrm>
-            <a:off x="4973517" y="652278"/>
+            <a:off x="4954062" y="573198"/>
             <a:ext cx="7021371" cy="1087180"/>
           </a:xfrm>
           <a:prstGeom prst="rect">

</xml_diff>